<commit_message>
remove pptx and update logo
</commit_message>
<xml_diff>
--- a/app.pptx
+++ b/app.pptx
@@ -104,6 +104,11 @@
       </a:defRPr>
     </a:lvl9pPr>
   </p:defaultTextStyle>
+  <p:extLst>
+    <p:ext uri="{EFAFB233-063F-42B5-8137-9DF3F51BA10A}">
+      <p15:sldGuideLst xmlns:p15="http://schemas.microsoft.com/office/powerpoint/2012/main"/>
+    </p:ext>
+  </p:extLst>
 </p:presentation>
 </file>
 
@@ -254,7 +259,7 @@
           <a:p>
             <a:fld id="{9DDFAC90-8E90-AB42-8A78-21EB43067FB1}" type="datetimeFigureOut">
               <a:rPr lang="en-US" smtClean="0"/>
-              <a:t>3/25/24</a:t>
+              <a:t>3/26/24</a:t>
             </a:fld>
             <a:endParaRPr lang="en-US"/>
           </a:p>
@@ -452,7 +457,7 @@
           <a:p>
             <a:fld id="{9DDFAC90-8E90-AB42-8A78-21EB43067FB1}" type="datetimeFigureOut">
               <a:rPr lang="en-US" smtClean="0"/>
-              <a:t>3/25/24</a:t>
+              <a:t>3/26/24</a:t>
             </a:fld>
             <a:endParaRPr lang="en-US"/>
           </a:p>
@@ -660,7 +665,7 @@
           <a:p>
             <a:fld id="{9DDFAC90-8E90-AB42-8A78-21EB43067FB1}" type="datetimeFigureOut">
               <a:rPr lang="en-US" smtClean="0"/>
-              <a:t>3/25/24</a:t>
+              <a:t>3/26/24</a:t>
             </a:fld>
             <a:endParaRPr lang="en-US"/>
           </a:p>
@@ -858,7 +863,7 @@
           <a:p>
             <a:fld id="{9DDFAC90-8E90-AB42-8A78-21EB43067FB1}" type="datetimeFigureOut">
               <a:rPr lang="en-US" smtClean="0"/>
-              <a:t>3/25/24</a:t>
+              <a:t>3/26/24</a:t>
             </a:fld>
             <a:endParaRPr lang="en-US"/>
           </a:p>
@@ -1133,7 +1138,7 @@
           <a:p>
             <a:fld id="{9DDFAC90-8E90-AB42-8A78-21EB43067FB1}" type="datetimeFigureOut">
               <a:rPr lang="en-US" smtClean="0"/>
-              <a:t>3/25/24</a:t>
+              <a:t>3/26/24</a:t>
             </a:fld>
             <a:endParaRPr lang="en-US"/>
           </a:p>
@@ -1398,7 +1403,7 @@
           <a:p>
             <a:fld id="{9DDFAC90-8E90-AB42-8A78-21EB43067FB1}" type="datetimeFigureOut">
               <a:rPr lang="en-US" smtClean="0"/>
-              <a:t>3/25/24</a:t>
+              <a:t>3/26/24</a:t>
             </a:fld>
             <a:endParaRPr lang="en-US"/>
           </a:p>
@@ -1810,7 +1815,7 @@
           <a:p>
             <a:fld id="{9DDFAC90-8E90-AB42-8A78-21EB43067FB1}" type="datetimeFigureOut">
               <a:rPr lang="en-US" smtClean="0"/>
-              <a:t>3/25/24</a:t>
+              <a:t>3/26/24</a:t>
             </a:fld>
             <a:endParaRPr lang="en-US"/>
           </a:p>
@@ -1951,7 +1956,7 @@
           <a:p>
             <a:fld id="{9DDFAC90-8E90-AB42-8A78-21EB43067FB1}" type="datetimeFigureOut">
               <a:rPr lang="en-US" smtClean="0"/>
-              <a:t>3/25/24</a:t>
+              <a:t>3/26/24</a:t>
             </a:fld>
             <a:endParaRPr lang="en-US"/>
           </a:p>
@@ -2064,7 +2069,7 @@
           <a:p>
             <a:fld id="{9DDFAC90-8E90-AB42-8A78-21EB43067FB1}" type="datetimeFigureOut">
               <a:rPr lang="en-US" smtClean="0"/>
-              <a:t>3/25/24</a:t>
+              <a:t>3/26/24</a:t>
             </a:fld>
             <a:endParaRPr lang="en-US"/>
           </a:p>
@@ -2375,7 +2380,7 @@
           <a:p>
             <a:fld id="{9DDFAC90-8E90-AB42-8A78-21EB43067FB1}" type="datetimeFigureOut">
               <a:rPr lang="en-US" smtClean="0"/>
-              <a:t>3/25/24</a:t>
+              <a:t>3/26/24</a:t>
             </a:fld>
             <a:endParaRPr lang="en-US"/>
           </a:p>
@@ -2663,7 +2668,7 @@
           <a:p>
             <a:fld id="{9DDFAC90-8E90-AB42-8A78-21EB43067FB1}" type="datetimeFigureOut">
               <a:rPr lang="en-US" smtClean="0"/>
-              <a:t>3/25/24</a:t>
+              <a:t>3/26/24</a:t>
             </a:fld>
             <a:endParaRPr lang="en-US"/>
           </a:p>
@@ -2904,7 +2909,7 @@
           <a:p>
             <a:fld id="{9DDFAC90-8E90-AB42-8A78-21EB43067FB1}" type="datetimeFigureOut">
               <a:rPr lang="en-US" smtClean="0"/>
-              <a:t>3/25/24</a:t>
+              <a:t>3/26/24</a:t>
             </a:fld>
             <a:endParaRPr lang="en-US"/>
           </a:p>
@@ -3418,16 +3423,10 @@
           <a:lstStyle/>
           <a:p>
             <a:r>
-              <a:rPr lang="en-US">
-                <a:latin typeface="Trebuchet MS" panose="020B0703020202090204" pitchFamily="34" charset="0"/>
-              </a:rPr>
-              <a:t>SOLUBILITY </a:t>
-            </a:r>
-            <a:r>
               <a:rPr lang="en-US" dirty="0">
                 <a:latin typeface="Trebuchet MS" panose="020B0703020202090204" pitchFamily="34" charset="0"/>
               </a:rPr>
-              <a:t>MODEL</a:t>
+              <a:t>SOLUBILITY MODEL</a:t>
             </a:r>
           </a:p>
         </p:txBody>
@@ -3461,16 +3460,34 @@
           <a:lstStyle/>
           <a:p>
             <a:r>
-              <a:rPr lang="en-US" i="1" dirty="0"/>
+              <a:rPr lang="en-US" i="1" dirty="0">
+                <a:latin typeface="Trebuchet MS" panose="020B0703020202090204" pitchFamily="34" charset="0"/>
+                <a:cs typeface="Aptos Serif" panose="020B0604020202020204" pitchFamily="34" charset="0"/>
+              </a:rPr>
               <a:t>by Kemal </a:t>
             </a:r>
             <a:r>
-              <a:rPr lang="en-US" i="1" dirty="0" err="1"/>
+              <a:rPr lang="en-US" i="1" dirty="0" err="1">
+                <a:latin typeface="Trebuchet MS" panose="020B0703020202090204" pitchFamily="34" charset="0"/>
+                <a:cs typeface="Aptos Serif" panose="020B0604020202020204" pitchFamily="34" charset="0"/>
+              </a:rPr>
               <a:t>Ozalp</a:t>
             </a:r>
             <a:r>
-              <a:rPr lang="en-US" i="1" dirty="0"/>
+              <a:rPr lang="en-US" i="1" dirty="0">
+                <a:latin typeface="Trebuchet MS" panose="020B0703020202090204" pitchFamily="34" charset="0"/>
+                <a:cs typeface="Aptos Serif" panose="020B0604020202020204" pitchFamily="34" charset="0"/>
+              </a:rPr>
               <a:t>, Ph.D.</a:t>
+            </a:r>
+          </a:p>
+          <a:p>
+            <a:r>
+              <a:rPr lang="en-US" i="1" dirty="0">
+                <a:latin typeface="Trebuchet MS" panose="020B0703020202090204" pitchFamily="34" charset="0"/>
+                <a:cs typeface="Aptos Serif" panose="020B0604020202020204" pitchFamily="34" charset="0"/>
+              </a:rPr>
+              <a:t>- Data Scientist - </a:t>
             </a:r>
           </a:p>
         </p:txBody>
@@ -4602,6 +4619,52 @@
                                           <p:spTgt spid="3">
                                             <p:txEl>
                                               <p:pRg st="0" end="0"/>
+                                            </p:txEl>
+                                          </p:spTgt>
+                                        </p:tgtEl>
+                                      </p:cBhvr>
+                                    </p:animEffect>
+                                  </p:childTnLst>
+                                </p:cTn>
+                              </p:par>
+                              <p:par>
+                                <p:cTn id="11" presetID="10" presetClass="entr" presetSubtype="0" fill="hold" grpId="0" nodeType="withEffect">
+                                  <p:stCondLst>
+                                    <p:cond delay="2000"/>
+                                  </p:stCondLst>
+                                  <p:iterate type="lt">
+                                    <p:tmPct val="10000"/>
+                                  </p:iterate>
+                                  <p:childTnLst>
+                                    <p:set>
+                                      <p:cBhvr>
+                                        <p:cTn id="12" dur="1" fill="hold">
+                                          <p:stCondLst>
+                                            <p:cond delay="0"/>
+                                          </p:stCondLst>
+                                        </p:cTn>
+                                        <p:tgtEl>
+                                          <p:spTgt spid="3">
+                                            <p:txEl>
+                                              <p:pRg st="1" end="1"/>
+                                            </p:txEl>
+                                          </p:spTgt>
+                                        </p:tgtEl>
+                                        <p:attrNameLst>
+                                          <p:attrName>style.visibility</p:attrName>
+                                        </p:attrNameLst>
+                                      </p:cBhvr>
+                                      <p:to>
+                                        <p:strVal val="visible"/>
+                                      </p:to>
+                                    </p:set>
+                                    <p:animEffect transition="in" filter="fade">
+                                      <p:cBhvr>
+                                        <p:cTn id="13" dur="400"/>
+                                        <p:tgtEl>
+                                          <p:spTgt spid="3">
+                                            <p:txEl>
+                                              <p:pRg st="1" end="1"/>
                                             </p:txEl>
                                           </p:spTgt>
                                         </p:tgtEl>

</xml_diff>